<commit_message>
just improved a litllte bit the design of presenation
</commit_message>
<xml_diff>
--- a/poodle_project/Documents/presentation/Final_presentation.pptx
+++ b/poodle_project/Documents/presentation/Final_presentation.pptx
@@ -5,10 +5,14 @@
     <p:sldMasterId id="2147483648" r:id="rId1"/>
   </p:sldMasterIdLst>
   <p:notesMasterIdLst>
-    <p:notesMasterId r:id="rId3"/>
+    <p:notesMasterId r:id="rId7"/>
   </p:notesMasterIdLst>
   <p:sldIdLst>
     <p:sldId id="256" r:id="rId2"/>
+    <p:sldId id="257" r:id="rId3"/>
+    <p:sldId id="258" r:id="rId4"/>
+    <p:sldId id="259" r:id="rId5"/>
+    <p:sldId id="260" r:id="rId6"/>
   </p:sldIdLst>
   <p:sldSz cx="12192000" cy="6858000"/>
   <p:notesSz cx="6858000" cy="9144000"/>
@@ -107,6 +111,43 @@
       </a:defRPr>
     </a:lvl9pPr>
   </p:defaultTextStyle>
+  <p:extLst>
+    <p:ext uri="{521415D9-36F7-43E2-AB2F-B90AF26B5E84}">
+      <p14:sectionLst xmlns:p14="http://schemas.microsoft.com/office/powerpoint/2010/main">
+        <p14:section name="Standardabschnitt" id="{C0E0118F-3A11-4EC6-A5FE-071FD0004AF1}">
+          <p14:sldIdLst>
+            <p14:sldId id="256"/>
+          </p14:sldIdLst>
+        </p14:section>
+        <p14:section name="BIologic Background" id="{655667BF-6F7F-4806-BF68-37A52688A110}">
+          <p14:sldIdLst>
+            <p14:sldId id="257"/>
+          </p14:sldIdLst>
+        </p14:section>
+        <p14:section name="DB-Introduction" id="{015ECD29-E036-4053-BA2B-B077048BBBC3}">
+          <p14:sldIdLst>
+            <p14:sldId id="258"/>
+          </p14:sldIdLst>
+        </p14:section>
+        <p14:section name="Features" id="{169E09D8-2518-4A48-81E3-213A13CB49AB}">
+          <p14:sldIdLst>
+            <p14:sldId id="259"/>
+          </p14:sldIdLst>
+        </p14:section>
+        <p14:section name="Results" id="{5D4D69A5-9307-4658-B4F1-5ECE2B2C1B91}">
+          <p14:sldIdLst>
+            <p14:sldId id="260"/>
+          </p14:sldIdLst>
+        </p14:section>
+        <p14:section name="End" id="{B20577F3-6B8B-4F5D-BAE1-AA751CB95EEC}">
+          <p14:sldIdLst/>
+        </p14:section>
+      </p14:sectionLst>
+    </p:ext>
+    <p:ext uri="{EFAFB233-063F-42B5-8137-9DF3F51BA10A}">
+      <p15:sldGuideLst xmlns:p15="http://schemas.microsoft.com/office/powerpoint/2012/main"/>
+    </p:ext>
+  </p:extLst>
 </p:presentation>
 </file>
 
@@ -192,7 +233,7 @@
           <a:p>
             <a:fld id="{1DF4E2D5-ADBF-4C36-9513-770622D94BA2}" type="datetimeFigureOut">
               <a:rPr lang="de-DE" smtClean="0"/>
-              <a:t>07.11.2015</a:t>
+              <a:t>19.11.2015</a:t>
             </a:fld>
             <a:endParaRPr lang="de-DE"/>
           </a:p>
@@ -497,15 +538,23 @@
           <a:bodyPr anchor="b"/>
           <a:lstStyle>
             <a:lvl1pPr algn="ctr">
-              <a:defRPr sz="6000"/>
+              <a:defRPr sz="6000">
+                <a:solidFill>
+                  <a:schemeClr val="tx1">
+                    <a:lumMod val="50000"/>
+                    <a:lumOff val="50000"/>
+                  </a:schemeClr>
+                </a:solidFill>
+                <a:latin typeface="Myriad Pro Light" panose="020B0603030403020204" pitchFamily="34" charset="0"/>
+              </a:defRPr>
             </a:lvl1pPr>
           </a:lstStyle>
           <a:p>
             <a:r>
-              <a:rPr lang="de-DE" smtClean="0"/>
+              <a:rPr lang="de-DE" dirty="0" smtClean="0"/>
               <a:t>Titelmasterformat durch Klicken bearbeiten</a:t>
             </a:r>
-            <a:endParaRPr lang="de-DE"/>
+            <a:endParaRPr lang="de-DE" dirty="0"/>
           </a:p>
         </p:txBody>
       </p:sp>
@@ -530,7 +579,13 @@
           <a:lstStyle>
             <a:lvl1pPr marL="0" indent="0" algn="ctr">
               <a:buNone/>
-              <a:defRPr sz="2400"/>
+              <a:defRPr sz="2400" i="0">
+                <a:solidFill>
+                  <a:schemeClr val="bg1">
+                    <a:lumMod val="65000"/>
+                  </a:schemeClr>
+                </a:solidFill>
+              </a:defRPr>
             </a:lvl1pPr>
             <a:lvl2pPr marL="457200" indent="0" algn="ctr">
               <a:buNone/>
@@ -567,43 +622,13 @@
           </a:lstStyle>
           <a:p>
             <a:r>
-              <a:rPr lang="de-DE" smtClean="0"/>
+              <a:rPr lang="de-DE" dirty="0" smtClean="0"/>
               <a:t>Formatvorlage des Untertitelmasters durch Klicken bearbeiten</a:t>
             </a:r>
-            <a:endParaRPr lang="de-DE"/>
-          </a:p>
-        </p:txBody>
-      </p:sp>
-      <p:pic>
-        <p:nvPicPr>
-          <p:cNvPr id="19" name="Grafik 18"/>
-          <p:cNvPicPr>
-            <a:picLocks noChangeAspect="1"/>
-          </p:cNvPicPr>
-          <p:nvPr userDrawn="1"/>
-        </p:nvPicPr>
-        <p:blipFill>
-          <a:blip r:embed="rId2">
-            <a:extLst>
-              <a:ext uri="{28A0092B-C50C-407E-A947-70E740481C1C}">
-                <a14:useLocalDpi xmlns:a14="http://schemas.microsoft.com/office/drawing/2010/main" val="0"/>
-              </a:ext>
-            </a:extLst>
-          </a:blip>
-          <a:stretch>
-            <a:fillRect/>
-          </a:stretch>
-        </p:blipFill>
-        <p:spPr>
-          <a:xfrm>
-            <a:off x="0" y="819"/>
-            <a:ext cx="11933382" cy="6927430"/>
-          </a:xfrm>
-          <a:prstGeom prst="rect">
-            <a:avLst/>
-          </a:prstGeom>
-        </p:spPr>
-      </p:pic>
+            <a:endParaRPr lang="de-DE" dirty="0"/>
+          </a:p>
+        </p:txBody>
+      </p:sp>
     </p:spTree>
     <p:extLst>
       <p:ext uri="{BB962C8B-B14F-4D97-AF65-F5344CB8AC3E}">
@@ -624,364 +649,6 @@
 </p:sldLayout>
 </file>
 
-<file path=ppt/slideLayouts/slideLayout10.xml><?xml version="1.0" encoding="utf-8"?>
-<p:sldLayout xmlns:a="http://schemas.openxmlformats.org/drawingml/2006/main" xmlns:r="http://schemas.openxmlformats.org/officeDocument/2006/relationships" xmlns:p="http://schemas.openxmlformats.org/presentationml/2006/main" type="vertTx" preserve="1">
-  <p:cSld name="Titel und vertikaler Text">
-    <p:spTree>
-      <p:nvGrpSpPr>
-        <p:cNvPr id="1" name=""/>
-        <p:cNvGrpSpPr/>
-        <p:nvPr/>
-      </p:nvGrpSpPr>
-      <p:grpSpPr>
-        <a:xfrm>
-          <a:off x="0" y="0"/>
-          <a:ext cx="0" cy="0"/>
-          <a:chOff x="0" y="0"/>
-          <a:chExt cx="0" cy="0"/>
-        </a:xfrm>
-      </p:grpSpPr>
-      <p:sp>
-        <p:nvSpPr>
-          <p:cNvPr id="2" name="Titel 1"/>
-          <p:cNvSpPr>
-            <a:spLocks noGrp="1"/>
-          </p:cNvSpPr>
-          <p:nvPr>
-            <p:ph type="title"/>
-          </p:nvPr>
-        </p:nvSpPr>
-        <p:spPr/>
-        <p:txBody>
-          <a:bodyPr/>
-          <a:lstStyle/>
-          <a:p>
-            <a:r>
-              <a:rPr lang="de-DE" smtClean="0"/>
-              <a:t>Titelmasterformat durch Klicken bearbeiten</a:t>
-            </a:r>
-            <a:endParaRPr lang="de-DE"/>
-          </a:p>
-        </p:txBody>
-      </p:sp>
-      <p:sp>
-        <p:nvSpPr>
-          <p:cNvPr id="3" name="Vertikaler Textplatzhalter 2"/>
-          <p:cNvSpPr>
-            <a:spLocks noGrp="1"/>
-          </p:cNvSpPr>
-          <p:nvPr>
-            <p:ph type="body" orient="vert" idx="1"/>
-          </p:nvPr>
-        </p:nvSpPr>
-        <p:spPr/>
-        <p:txBody>
-          <a:bodyPr vert="eaVert"/>
-          <a:lstStyle/>
-          <a:p>
-            <a:pPr lvl="0"/>
-            <a:r>
-              <a:rPr lang="de-DE" smtClean="0"/>
-              <a:t>Formatvorlagen des Textmasters bearbeiten</a:t>
-            </a:r>
-          </a:p>
-          <a:p>
-            <a:pPr lvl="1"/>
-            <a:r>
-              <a:rPr lang="de-DE" smtClean="0"/>
-              <a:t>Zweite Ebene</a:t>
-            </a:r>
-          </a:p>
-          <a:p>
-            <a:pPr lvl="2"/>
-            <a:r>
-              <a:rPr lang="de-DE" smtClean="0"/>
-              <a:t>Dritte Ebene</a:t>
-            </a:r>
-          </a:p>
-          <a:p>
-            <a:pPr lvl="3"/>
-            <a:r>
-              <a:rPr lang="de-DE" smtClean="0"/>
-              <a:t>Vierte Ebene</a:t>
-            </a:r>
-          </a:p>
-          <a:p>
-            <a:pPr lvl="4"/>
-            <a:r>
-              <a:rPr lang="de-DE" smtClean="0"/>
-              <a:t>Fünfte Ebene</a:t>
-            </a:r>
-            <a:endParaRPr lang="de-DE"/>
-          </a:p>
-        </p:txBody>
-      </p:sp>
-      <p:sp>
-        <p:nvSpPr>
-          <p:cNvPr id="4" name="Datumsplatzhalter 3"/>
-          <p:cNvSpPr>
-            <a:spLocks noGrp="1"/>
-          </p:cNvSpPr>
-          <p:nvPr>
-            <p:ph type="dt" sz="half" idx="10"/>
-          </p:nvPr>
-        </p:nvSpPr>
-        <p:spPr/>
-        <p:txBody>
-          <a:bodyPr/>
-          <a:lstStyle/>
-          <a:p>
-            <a:fld id="{045923B0-3F80-44B8-A0B6-5B319DDFD4C7}" type="datetime1">
-              <a:rPr lang="de-DE" smtClean="0"/>
-              <a:t>07.11.2015</a:t>
-            </a:fld>
-            <a:endParaRPr lang="de-DE"/>
-          </a:p>
-        </p:txBody>
-      </p:sp>
-      <p:sp>
-        <p:nvSpPr>
-          <p:cNvPr id="5" name="Fußzeilenplatzhalter 4"/>
-          <p:cNvSpPr>
-            <a:spLocks noGrp="1"/>
-          </p:cNvSpPr>
-          <p:nvPr>
-            <p:ph type="ftr" sz="quarter" idx="11"/>
-          </p:nvPr>
-        </p:nvSpPr>
-        <p:spPr/>
-        <p:txBody>
-          <a:bodyPr/>
-          <a:lstStyle/>
-          <a:p>
-            <a:r>
-              <a:rPr lang="de-DE" smtClean="0"/>
-              <a:t>Poodle Project - Jonas Ditz and Benjamin Schroeder</a:t>
-            </a:r>
-            <a:endParaRPr lang="de-DE"/>
-          </a:p>
-        </p:txBody>
-      </p:sp>
-      <p:sp>
-        <p:nvSpPr>
-          <p:cNvPr id="6" name="Foliennummernplatzhalter 5"/>
-          <p:cNvSpPr>
-            <a:spLocks noGrp="1"/>
-          </p:cNvSpPr>
-          <p:nvPr>
-            <p:ph type="sldNum" sz="quarter" idx="12"/>
-          </p:nvPr>
-        </p:nvSpPr>
-        <p:spPr/>
-        <p:txBody>
-          <a:bodyPr/>
-          <a:lstStyle/>
-          <a:p>
-            <a:fld id="{E8AB856E-2E56-4FC0-8A9B-687E2E16A621}" type="slidenum">
-              <a:rPr lang="de-DE" smtClean="0"/>
-              <a:t>‹Nr.›</a:t>
-            </a:fld>
-            <a:endParaRPr lang="de-DE"/>
-          </a:p>
-        </p:txBody>
-      </p:sp>
-    </p:spTree>
-    <p:extLst>
-      <p:ext uri="{BB962C8B-B14F-4D97-AF65-F5344CB8AC3E}">
-        <p14:creationId xmlns:p14="http://schemas.microsoft.com/office/powerpoint/2010/main" val="3673443334"/>
-      </p:ext>
-    </p:extLst>
-  </p:cSld>
-  <p:clrMapOvr>
-    <a:masterClrMapping/>
-  </p:clrMapOvr>
-</p:sldLayout>
-</file>
-
-<file path=ppt/slideLayouts/slideLayout11.xml><?xml version="1.0" encoding="utf-8"?>
-<p:sldLayout xmlns:a="http://schemas.openxmlformats.org/drawingml/2006/main" xmlns:r="http://schemas.openxmlformats.org/officeDocument/2006/relationships" xmlns:p="http://schemas.openxmlformats.org/presentationml/2006/main" type="vertTitleAndTx" preserve="1">
-  <p:cSld name="Vertikaler Titel und Text">
-    <p:spTree>
-      <p:nvGrpSpPr>
-        <p:cNvPr id="1" name=""/>
-        <p:cNvGrpSpPr/>
-        <p:nvPr/>
-      </p:nvGrpSpPr>
-      <p:grpSpPr>
-        <a:xfrm>
-          <a:off x="0" y="0"/>
-          <a:ext cx="0" cy="0"/>
-          <a:chOff x="0" y="0"/>
-          <a:chExt cx="0" cy="0"/>
-        </a:xfrm>
-      </p:grpSpPr>
-      <p:sp>
-        <p:nvSpPr>
-          <p:cNvPr id="2" name="Vertikaler Titel 1"/>
-          <p:cNvSpPr>
-            <a:spLocks noGrp="1"/>
-          </p:cNvSpPr>
-          <p:nvPr>
-            <p:ph type="title" orient="vert"/>
-          </p:nvPr>
-        </p:nvSpPr>
-        <p:spPr>
-          <a:xfrm>
-            <a:off x="8724900" y="365125"/>
-            <a:ext cx="2628900" cy="5811838"/>
-          </a:xfrm>
-        </p:spPr>
-        <p:txBody>
-          <a:bodyPr vert="eaVert"/>
-          <a:lstStyle/>
-          <a:p>
-            <a:r>
-              <a:rPr lang="de-DE" smtClean="0"/>
-              <a:t>Titelmasterformat durch Klicken bearbeiten</a:t>
-            </a:r>
-            <a:endParaRPr lang="de-DE"/>
-          </a:p>
-        </p:txBody>
-      </p:sp>
-      <p:sp>
-        <p:nvSpPr>
-          <p:cNvPr id="3" name="Vertikaler Textplatzhalter 2"/>
-          <p:cNvSpPr>
-            <a:spLocks noGrp="1"/>
-          </p:cNvSpPr>
-          <p:nvPr>
-            <p:ph type="body" orient="vert" idx="1"/>
-          </p:nvPr>
-        </p:nvSpPr>
-        <p:spPr>
-          <a:xfrm>
-            <a:off x="838200" y="365125"/>
-            <a:ext cx="7734300" cy="5811838"/>
-          </a:xfrm>
-        </p:spPr>
-        <p:txBody>
-          <a:bodyPr vert="eaVert"/>
-          <a:lstStyle/>
-          <a:p>
-            <a:pPr lvl="0"/>
-            <a:r>
-              <a:rPr lang="de-DE" smtClean="0"/>
-              <a:t>Formatvorlagen des Textmasters bearbeiten</a:t>
-            </a:r>
-          </a:p>
-          <a:p>
-            <a:pPr lvl="1"/>
-            <a:r>
-              <a:rPr lang="de-DE" smtClean="0"/>
-              <a:t>Zweite Ebene</a:t>
-            </a:r>
-          </a:p>
-          <a:p>
-            <a:pPr lvl="2"/>
-            <a:r>
-              <a:rPr lang="de-DE" smtClean="0"/>
-              <a:t>Dritte Ebene</a:t>
-            </a:r>
-          </a:p>
-          <a:p>
-            <a:pPr lvl="3"/>
-            <a:r>
-              <a:rPr lang="de-DE" smtClean="0"/>
-              <a:t>Vierte Ebene</a:t>
-            </a:r>
-          </a:p>
-          <a:p>
-            <a:pPr lvl="4"/>
-            <a:r>
-              <a:rPr lang="de-DE" smtClean="0"/>
-              <a:t>Fünfte Ebene</a:t>
-            </a:r>
-            <a:endParaRPr lang="de-DE"/>
-          </a:p>
-        </p:txBody>
-      </p:sp>
-      <p:sp>
-        <p:nvSpPr>
-          <p:cNvPr id="4" name="Datumsplatzhalter 3"/>
-          <p:cNvSpPr>
-            <a:spLocks noGrp="1"/>
-          </p:cNvSpPr>
-          <p:nvPr>
-            <p:ph type="dt" sz="half" idx="10"/>
-          </p:nvPr>
-        </p:nvSpPr>
-        <p:spPr/>
-        <p:txBody>
-          <a:bodyPr/>
-          <a:lstStyle/>
-          <a:p>
-            <a:fld id="{7CED7C3A-0CDC-49E4-940B-A959869D9ACC}" type="datetime1">
-              <a:rPr lang="de-DE" smtClean="0"/>
-              <a:t>07.11.2015</a:t>
-            </a:fld>
-            <a:endParaRPr lang="de-DE"/>
-          </a:p>
-        </p:txBody>
-      </p:sp>
-      <p:sp>
-        <p:nvSpPr>
-          <p:cNvPr id="5" name="Fußzeilenplatzhalter 4"/>
-          <p:cNvSpPr>
-            <a:spLocks noGrp="1"/>
-          </p:cNvSpPr>
-          <p:nvPr>
-            <p:ph type="ftr" sz="quarter" idx="11"/>
-          </p:nvPr>
-        </p:nvSpPr>
-        <p:spPr/>
-        <p:txBody>
-          <a:bodyPr/>
-          <a:lstStyle/>
-          <a:p>
-            <a:r>
-              <a:rPr lang="de-DE" smtClean="0"/>
-              <a:t>Poodle Project - Jonas Ditz and Benjamin Schroeder</a:t>
-            </a:r>
-            <a:endParaRPr lang="de-DE"/>
-          </a:p>
-        </p:txBody>
-      </p:sp>
-      <p:sp>
-        <p:nvSpPr>
-          <p:cNvPr id="6" name="Foliennummernplatzhalter 5"/>
-          <p:cNvSpPr>
-            <a:spLocks noGrp="1"/>
-          </p:cNvSpPr>
-          <p:nvPr>
-            <p:ph type="sldNum" sz="quarter" idx="12"/>
-          </p:nvPr>
-        </p:nvSpPr>
-        <p:spPr/>
-        <p:txBody>
-          <a:bodyPr/>
-          <a:lstStyle/>
-          <a:p>
-            <a:fld id="{E8AB856E-2E56-4FC0-8A9B-687E2E16A621}" type="slidenum">
-              <a:rPr lang="de-DE" smtClean="0"/>
-              <a:t>‹Nr.›</a:t>
-            </a:fld>
-            <a:endParaRPr lang="de-DE"/>
-          </a:p>
-        </p:txBody>
-      </p:sp>
-    </p:spTree>
-    <p:extLst>
-      <p:ext uri="{BB962C8B-B14F-4D97-AF65-F5344CB8AC3E}">
-        <p14:creationId xmlns:p14="http://schemas.microsoft.com/office/powerpoint/2010/main" val="2637246803"/>
-      </p:ext>
-    </p:extLst>
-  </p:cSld>
-  <p:clrMapOvr>
-    <a:masterClrMapping/>
-  </p:clrMapOvr>
-</p:sldLayout>
-</file>
-
 <file path=ppt/slideLayouts/slideLayout2.xml><?xml version="1.0" encoding="utf-8"?>
 <p:sldLayout xmlns:a="http://schemas.openxmlformats.org/drawingml/2006/main" xmlns:r="http://schemas.openxmlformats.org/officeDocument/2006/relationships" xmlns:p="http://schemas.openxmlformats.org/presentationml/2006/main" type="obj" preserve="1">
   <p:cSld name="Titel und Inhalt">
@@ -1012,13 +679,25 @@
         <p:spPr/>
         <p:txBody>
           <a:bodyPr/>
-          <a:lstStyle/>
-          <a:p>
-            <a:r>
-              <a:rPr lang="de-DE" smtClean="0"/>
+          <a:lstStyle>
+            <a:lvl1pPr>
+              <a:defRPr>
+                <a:solidFill>
+                  <a:schemeClr val="tx1">
+                    <a:lumMod val="50000"/>
+                    <a:lumOff val="50000"/>
+                  </a:schemeClr>
+                </a:solidFill>
+                <a:latin typeface="Myriad Pro Light" panose="020B0603030403020204" pitchFamily="34" charset="0"/>
+              </a:defRPr>
+            </a:lvl1pPr>
+          </a:lstStyle>
+          <a:p>
+            <a:r>
+              <a:rPr lang="de-DE" dirty="0" smtClean="0"/>
               <a:t>Titelmasterformat durch Klicken bearbeiten</a:t>
             </a:r>
-            <a:endParaRPr lang="de-DE"/>
+            <a:endParaRPr lang="de-DE" dirty="0"/>
           </a:p>
         </p:txBody>
       </p:sp>
@@ -1091,7 +770,7 @@
           <a:p>
             <a:fld id="{3A9EBC61-E80D-42A0-BF7D-1DD7BEDB77ED}" type="datetime1">
               <a:rPr lang="de-DE" smtClean="0"/>
-              <a:t>07.11.2015</a:t>
+              <a:t>19.11.2015</a:t>
             </a:fld>
             <a:endParaRPr lang="de-DE"/>
           </a:p>
@@ -1348,7 +1027,7 @@
           <a:p>
             <a:fld id="{26D4891C-99CF-45C2-90DD-4E1B611976A3}" type="datetime1">
               <a:rPr lang="de-DE" smtClean="0"/>
-              <a:t>07.11.2015</a:t>
+              <a:t>19.11.2015</a:t>
             </a:fld>
             <a:endParaRPr lang="de-DE"/>
           </a:p>
@@ -1443,13 +1122,25 @@
         <p:spPr/>
         <p:txBody>
           <a:bodyPr/>
-          <a:lstStyle/>
-          <a:p>
-            <a:r>
-              <a:rPr lang="de-DE" smtClean="0"/>
+          <a:lstStyle>
+            <a:lvl1pPr>
+              <a:defRPr>
+                <a:solidFill>
+                  <a:schemeClr val="tx1">
+                    <a:lumMod val="50000"/>
+                    <a:lumOff val="50000"/>
+                  </a:schemeClr>
+                </a:solidFill>
+                <a:latin typeface="Myriad Pro Light" panose="020B0603030403020204" pitchFamily="34" charset="0"/>
+              </a:defRPr>
+            </a:lvl1pPr>
+          </a:lstStyle>
+          <a:p>
+            <a:r>
+              <a:rPr lang="de-DE" dirty="0" smtClean="0"/>
               <a:t>Titelmasterformat durch Klicken bearbeiten</a:t>
             </a:r>
-            <a:endParaRPr lang="de-DE"/>
+            <a:endParaRPr lang="de-DE" dirty="0"/>
           </a:p>
         </p:txBody>
       </p:sp>
@@ -1584,7 +1275,7 @@
           <a:p>
             <a:fld id="{3093ABA4-49A1-4A3B-A09A-E4B092570BB9}" type="datetime1">
               <a:rPr lang="de-DE" smtClean="0"/>
-              <a:t>07.11.2015</a:t>
+              <a:t>19.11.2015</a:t>
             </a:fld>
             <a:endParaRPr lang="de-DE"/>
           </a:p>
@@ -1955,7 +1646,7 @@
           <a:p>
             <a:fld id="{A4F05493-035F-414F-8851-F2C945E744DA}" type="datetime1">
               <a:rPr lang="de-DE" smtClean="0"/>
-              <a:t>07.11.2015</a:t>
+              <a:t>19.11.2015</a:t>
             </a:fld>
             <a:endParaRPr lang="de-DE"/>
           </a:p>
@@ -2050,13 +1741,25 @@
         <p:spPr/>
         <p:txBody>
           <a:bodyPr/>
-          <a:lstStyle/>
-          <a:p>
-            <a:r>
-              <a:rPr lang="de-DE" smtClean="0"/>
+          <a:lstStyle>
+            <a:lvl1pPr>
+              <a:defRPr>
+                <a:solidFill>
+                  <a:schemeClr val="tx1">
+                    <a:lumMod val="50000"/>
+                    <a:lumOff val="50000"/>
+                  </a:schemeClr>
+                </a:solidFill>
+                <a:latin typeface="Myriad Pro Light" panose="020B0603030403020204" pitchFamily="34" charset="0"/>
+              </a:defRPr>
+            </a:lvl1pPr>
+          </a:lstStyle>
+          <a:p>
+            <a:r>
+              <a:rPr lang="de-DE" dirty="0" smtClean="0"/>
               <a:t>Titelmasterformat durch Klicken bearbeiten</a:t>
             </a:r>
-            <a:endParaRPr lang="de-DE"/>
+            <a:endParaRPr lang="de-DE" dirty="0"/>
           </a:p>
         </p:txBody>
       </p:sp>
@@ -2077,7 +1780,7 @@
           <a:p>
             <a:fld id="{A849B479-773E-4D08-B6D8-EEBA506408B5}" type="datetime1">
               <a:rPr lang="de-DE" smtClean="0"/>
-              <a:t>07.11.2015</a:t>
+              <a:t>19.11.2015</a:t>
             </a:fld>
             <a:endParaRPr lang="de-DE"/>
           </a:p>
@@ -2176,7 +1879,7 @@
           <a:p>
             <a:fld id="{622C6EB9-D790-4DAA-8651-42ACA2EB495C}" type="datetime1">
               <a:rPr lang="de-DE" smtClean="0"/>
-              <a:t>07.11.2015</a:t>
+              <a:t>19.11.2015</a:t>
             </a:fld>
             <a:endParaRPr lang="de-DE"/>
           </a:p>
@@ -2457,7 +2160,7 @@
           <a:p>
             <a:fld id="{BC77BC02-16EC-4E72-8F6B-C7C26A7453C6}" type="datetime1">
               <a:rPr lang="de-DE" smtClean="0"/>
-              <a:t>07.11.2015</a:t>
+              <a:t>19.11.2015</a:t>
             </a:fld>
             <a:endParaRPr lang="de-DE"/>
           </a:p>
@@ -2714,7 +2417,7 @@
           <a:p>
             <a:fld id="{644CB333-CD34-42B9-BABA-E3B01337A305}" type="datetime1">
               <a:rPr lang="de-DE" smtClean="0"/>
-              <a:t>07.11.2015</a:t>
+              <a:t>19.11.2015</a:t>
             </a:fld>
             <a:endParaRPr lang="de-DE"/>
           </a:p>
@@ -2827,10 +2530,10 @@
           <a:lstStyle/>
           <a:p>
             <a:r>
-              <a:rPr lang="de-DE" smtClean="0"/>
+              <a:rPr lang="de-DE" dirty="0" smtClean="0"/>
               <a:t>Titelmasterformat durch Klicken bearbeiten</a:t>
             </a:r>
-            <a:endParaRPr lang="de-DE"/>
+            <a:endParaRPr lang="de-DE" dirty="0"/>
           </a:p>
         </p:txBody>
       </p:sp>
@@ -2861,38 +2564,38 @@
           <a:p>
             <a:pPr lvl="0"/>
             <a:r>
-              <a:rPr lang="de-DE" smtClean="0"/>
+              <a:rPr lang="de-DE" dirty="0" smtClean="0"/>
               <a:t>Formatvorlagen des Textmasters bearbeiten</a:t>
             </a:r>
           </a:p>
           <a:p>
             <a:pPr lvl="1"/>
             <a:r>
-              <a:rPr lang="de-DE" smtClean="0"/>
+              <a:rPr lang="de-DE" dirty="0" smtClean="0"/>
               <a:t>Zweite Ebene</a:t>
             </a:r>
           </a:p>
           <a:p>
             <a:pPr lvl="2"/>
             <a:r>
-              <a:rPr lang="de-DE" smtClean="0"/>
+              <a:rPr lang="de-DE" dirty="0" smtClean="0"/>
               <a:t>Dritte Ebene</a:t>
             </a:r>
           </a:p>
           <a:p>
             <a:pPr lvl="3"/>
             <a:r>
-              <a:rPr lang="de-DE" smtClean="0"/>
+              <a:rPr lang="de-DE" dirty="0" smtClean="0"/>
               <a:t>Vierte Ebene</a:t>
             </a:r>
           </a:p>
           <a:p>
             <a:pPr lvl="4"/>
             <a:r>
-              <a:rPr lang="de-DE" smtClean="0"/>
+              <a:rPr lang="de-DE" dirty="0" smtClean="0"/>
               <a:t>Fünfte Ebene</a:t>
             </a:r>
-            <a:endParaRPr lang="de-DE"/>
+            <a:endParaRPr lang="de-DE" dirty="0"/>
           </a:p>
         </p:txBody>
       </p:sp>
@@ -2931,7 +2634,7 @@
           <a:p>
             <a:fld id="{E93B68DF-2443-42A8-9B0B-77ABCB4A1A73}" type="datetime1">
               <a:rPr lang="de-DE" smtClean="0"/>
-              <a:t>07.11.2015</a:t>
+              <a:t>19.11.2015</a:t>
             </a:fld>
             <a:endParaRPr lang="de-DE"/>
           </a:p>
@@ -3019,36 +2722,127 @@
           </a:p>
         </p:txBody>
       </p:sp>
-      <p:pic>
-        <p:nvPicPr>
-          <p:cNvPr id="7" name="Grafik 6"/>
-          <p:cNvPicPr>
-            <a:picLocks noChangeAspect="1"/>
-          </p:cNvPicPr>
+      <p:grpSp>
+        <p:nvGrpSpPr>
+          <p:cNvPr id="14" name="Gruppieren 13"/>
+          <p:cNvGrpSpPr/>
           <p:nvPr userDrawn="1"/>
-        </p:nvPicPr>
-        <p:blipFill>
-          <a:blip r:embed="rId13" cstate="print">
-            <a:extLst>
-              <a:ext uri="{28A0092B-C50C-407E-A947-70E740481C1C}">
-                <a14:useLocalDpi xmlns:a14="http://schemas.microsoft.com/office/drawing/2010/main" val="0"/>
-              </a:ext>
-            </a:extLst>
-          </a:blip>
-          <a:stretch>
-            <a:fillRect/>
-          </a:stretch>
-        </p:blipFill>
+        </p:nvGrpSpPr>
+        <p:grpSpPr>
+          <a:xfrm>
+            <a:off x="5093970" y="6217920"/>
+            <a:ext cx="7098030" cy="93980"/>
+            <a:chOff x="5093970" y="6217920"/>
+            <a:chExt cx="7098030" cy="93980"/>
+          </a:xfrm>
+        </p:grpSpPr>
+        <p:cxnSp>
+          <p:nvCxnSpPr>
+            <p:cNvPr id="12" name="Gerader Verbinder 11"/>
+            <p:cNvCxnSpPr/>
+            <p:nvPr userDrawn="1"/>
+          </p:nvCxnSpPr>
+          <p:spPr>
+            <a:xfrm flipH="1">
+              <a:off x="5356860" y="6217920"/>
+              <a:ext cx="6835140" cy="30480"/>
+            </a:xfrm>
+            <a:prstGeom prst="line">
+              <a:avLst/>
+            </a:prstGeom>
+            <a:ln w="38100"/>
+          </p:spPr>
+          <p:style>
+            <a:lnRef idx="1">
+              <a:schemeClr val="accent1"/>
+            </a:lnRef>
+            <a:fillRef idx="0">
+              <a:schemeClr val="accent1"/>
+            </a:fillRef>
+            <a:effectRef idx="0">
+              <a:schemeClr val="accent1"/>
+            </a:effectRef>
+            <a:fontRef idx="minor">
+              <a:schemeClr val="tx1"/>
+            </a:fontRef>
+          </p:style>
+        </p:cxnSp>
+        <p:cxnSp>
+          <p:nvCxnSpPr>
+            <p:cNvPr id="13" name="Gerader Verbinder 12"/>
+            <p:cNvCxnSpPr/>
+            <p:nvPr userDrawn="1"/>
+          </p:nvCxnSpPr>
+          <p:spPr>
+            <a:xfrm flipH="1">
+              <a:off x="5093970" y="6281420"/>
+              <a:ext cx="6835140" cy="30480"/>
+            </a:xfrm>
+            <a:prstGeom prst="line">
+              <a:avLst/>
+            </a:prstGeom>
+            <a:ln w="38100">
+              <a:solidFill>
+                <a:schemeClr val="accent6"/>
+              </a:solidFill>
+            </a:ln>
+          </p:spPr>
+          <p:style>
+            <a:lnRef idx="1">
+              <a:schemeClr val="accent1"/>
+            </a:lnRef>
+            <a:fillRef idx="0">
+              <a:schemeClr val="accent1"/>
+            </a:fillRef>
+            <a:effectRef idx="0">
+              <a:schemeClr val="accent1"/>
+            </a:effectRef>
+            <a:fontRef idx="minor">
+              <a:schemeClr val="tx1"/>
+            </a:fontRef>
+          </p:style>
+        </p:cxnSp>
+      </p:grpSp>
+      <p:sp>
+        <p:nvSpPr>
+          <p:cNvPr id="15" name="Rechteck 14"/>
+          <p:cNvSpPr/>
+          <p:nvPr userDrawn="1"/>
+        </p:nvSpPr>
         <p:spPr>
           <a:xfrm>
-            <a:off x="-30789" y="6356350"/>
-            <a:ext cx="823578" cy="501650"/>
+            <a:off x="-101600" y="-9236"/>
+            <a:ext cx="267852" cy="6867236"/>
           </a:xfrm>
           <a:prstGeom prst="rect">
             <a:avLst/>
           </a:prstGeom>
         </p:spPr>
-      </p:pic>
+        <p:style>
+          <a:lnRef idx="2">
+            <a:schemeClr val="accent5">
+              <a:shade val="50000"/>
+            </a:schemeClr>
+          </a:lnRef>
+          <a:fillRef idx="1">
+            <a:schemeClr val="accent5"/>
+          </a:fillRef>
+          <a:effectRef idx="0">
+            <a:schemeClr val="accent5"/>
+          </a:effectRef>
+          <a:fontRef idx="minor">
+            <a:schemeClr val="lt1"/>
+          </a:fontRef>
+        </p:style>
+        <p:txBody>
+          <a:bodyPr rtlCol="0" anchor="ctr"/>
+          <a:lstStyle/>
+          <a:p>
+            <a:pPr algn="ctr"/>
+            <a:endParaRPr lang="de-DE"/>
+          </a:p>
+        </p:txBody>
+      </p:sp>
     </p:spTree>
     <p:extLst>
       <p:ext uri="{BB962C8B-B14F-4D97-AF65-F5344CB8AC3E}">
@@ -3067,8 +2861,6 @@
     <p:sldLayoutId id="2147483655" r:id="rId7"/>
     <p:sldLayoutId id="2147483656" r:id="rId8"/>
     <p:sldLayoutId id="2147483657" r:id="rId9"/>
-    <p:sldLayoutId id="2147483658" r:id="rId10"/>
-    <p:sldLayoutId id="2147483659" r:id="rId11"/>
   </p:sldLayoutIdLst>
   <p:timing>
     <p:tnLst>
@@ -3090,9 +2882,12 @@
         <a:buNone/>
         <a:defRPr sz="4400" kern="1200">
           <a:solidFill>
-            <a:schemeClr val="tx1"/>
+            <a:schemeClr val="tx1">
+              <a:lumMod val="50000"/>
+              <a:lumOff val="50000"/>
+            </a:schemeClr>
           </a:solidFill>
-          <a:latin typeface="+mj-lt"/>
+          <a:latin typeface="Myriad Pro Light" panose="020B0603030403020204" pitchFamily="34" charset="0"/>
           <a:ea typeface="+mj-ea"/>
           <a:cs typeface="+mj-cs"/>
         </a:defRPr>
@@ -3464,6 +3259,630 @@
     <p:extLst>
       <p:ext uri="{BB962C8B-B14F-4D97-AF65-F5344CB8AC3E}">
         <p14:creationId xmlns:p14="http://schemas.microsoft.com/office/powerpoint/2010/main" val="1851044699"/>
+      </p:ext>
+    </p:extLst>
+  </p:cSld>
+  <p:clrMapOvr>
+    <a:masterClrMapping/>
+  </p:clrMapOvr>
+  <p:timing>
+    <p:tnLst>
+      <p:par>
+        <p:cTn id="1" dur="indefinite" restart="never" nodeType="tmRoot"/>
+      </p:par>
+    </p:tnLst>
+  </p:timing>
+</p:sld>
+</file>
+
+<file path=ppt/slides/slide2.xml><?xml version="1.0" encoding="utf-8"?>
+<p:sld xmlns:a="http://schemas.openxmlformats.org/drawingml/2006/main" xmlns:r="http://schemas.openxmlformats.org/officeDocument/2006/relationships" xmlns:p="http://schemas.openxmlformats.org/presentationml/2006/main">
+  <p:cSld>
+    <p:spTree>
+      <p:nvGrpSpPr>
+        <p:cNvPr id="1" name=""/>
+        <p:cNvGrpSpPr/>
+        <p:nvPr/>
+      </p:nvGrpSpPr>
+      <p:grpSpPr>
+        <a:xfrm>
+          <a:off x="0" y="0"/>
+          <a:ext cx="0" cy="0"/>
+          <a:chOff x="0" y="0"/>
+          <a:chExt cx="0" cy="0"/>
+        </a:xfrm>
+      </p:grpSpPr>
+      <p:sp>
+        <p:nvSpPr>
+          <p:cNvPr id="2" name="Titel 1"/>
+          <p:cNvSpPr>
+            <a:spLocks noGrp="1"/>
+          </p:cNvSpPr>
+          <p:nvPr>
+            <p:ph type="title"/>
+          </p:nvPr>
+        </p:nvSpPr>
+        <p:spPr/>
+        <p:txBody>
+          <a:bodyPr/>
+          <a:lstStyle/>
+          <a:p>
+            <a:r>
+              <a:rPr lang="de-DE" dirty="0" err="1" smtClean="0"/>
+              <a:t>Introduction</a:t>
+            </a:r>
+            <a:r>
+              <a:rPr lang="de-DE" dirty="0" smtClean="0"/>
+              <a:t>: </a:t>
+            </a:r>
+            <a:r>
+              <a:rPr lang="de-DE" dirty="0" err="1" smtClean="0"/>
+              <a:t>Biology</a:t>
+            </a:r>
+            <a:endParaRPr lang="de-DE" dirty="0"/>
+          </a:p>
+        </p:txBody>
+      </p:sp>
+      <p:sp>
+        <p:nvSpPr>
+          <p:cNvPr id="3" name="Inhaltsplatzhalter 2"/>
+          <p:cNvSpPr>
+            <a:spLocks noGrp="1"/>
+          </p:cNvSpPr>
+          <p:nvPr>
+            <p:ph idx="1"/>
+          </p:nvPr>
+        </p:nvSpPr>
+        <p:spPr/>
+        <p:txBody>
+          <a:bodyPr/>
+          <a:lstStyle/>
+          <a:p>
+            <a:endParaRPr lang="de-DE"/>
+          </a:p>
+        </p:txBody>
+      </p:sp>
+      <p:sp>
+        <p:nvSpPr>
+          <p:cNvPr id="4" name="Datumsplatzhalter 3"/>
+          <p:cNvSpPr>
+            <a:spLocks noGrp="1"/>
+          </p:cNvSpPr>
+          <p:nvPr>
+            <p:ph type="dt" sz="half" idx="10"/>
+          </p:nvPr>
+        </p:nvSpPr>
+        <p:spPr/>
+        <p:txBody>
+          <a:bodyPr/>
+          <a:lstStyle/>
+          <a:p>
+            <a:fld id="{3A9EBC61-E80D-42A0-BF7D-1DD7BEDB77ED}" type="datetime1">
+              <a:rPr lang="de-DE" smtClean="0"/>
+              <a:t>19.11.2015</a:t>
+            </a:fld>
+            <a:endParaRPr lang="de-DE"/>
+          </a:p>
+        </p:txBody>
+      </p:sp>
+      <p:sp>
+        <p:nvSpPr>
+          <p:cNvPr id="5" name="Fußzeilenplatzhalter 4"/>
+          <p:cNvSpPr>
+            <a:spLocks noGrp="1"/>
+          </p:cNvSpPr>
+          <p:nvPr>
+            <p:ph type="ftr" sz="quarter" idx="11"/>
+          </p:nvPr>
+        </p:nvSpPr>
+        <p:spPr/>
+        <p:txBody>
+          <a:bodyPr/>
+          <a:lstStyle/>
+          <a:p>
+            <a:r>
+              <a:rPr lang="de-DE" smtClean="0"/>
+              <a:t>Poodle Project - Jonas Ditz and Benjamin Schroeder</a:t>
+            </a:r>
+            <a:endParaRPr lang="de-DE"/>
+          </a:p>
+        </p:txBody>
+      </p:sp>
+      <p:sp>
+        <p:nvSpPr>
+          <p:cNvPr id="6" name="Foliennummernplatzhalter 5"/>
+          <p:cNvSpPr>
+            <a:spLocks noGrp="1"/>
+          </p:cNvSpPr>
+          <p:nvPr>
+            <p:ph type="sldNum" sz="quarter" idx="12"/>
+          </p:nvPr>
+        </p:nvSpPr>
+        <p:spPr/>
+        <p:txBody>
+          <a:bodyPr/>
+          <a:lstStyle/>
+          <a:p>
+            <a:fld id="{E8AB856E-2E56-4FC0-8A9B-687E2E16A621}" type="slidenum">
+              <a:rPr lang="de-DE" smtClean="0"/>
+              <a:t>2</a:t>
+            </a:fld>
+            <a:endParaRPr lang="de-DE"/>
+          </a:p>
+        </p:txBody>
+      </p:sp>
+    </p:spTree>
+    <p:extLst>
+      <p:ext uri="{BB962C8B-B14F-4D97-AF65-F5344CB8AC3E}">
+        <p14:creationId xmlns:p14="http://schemas.microsoft.com/office/powerpoint/2010/main" val="1526950375"/>
+      </p:ext>
+    </p:extLst>
+  </p:cSld>
+  <p:clrMapOvr>
+    <a:masterClrMapping/>
+  </p:clrMapOvr>
+  <p:timing>
+    <p:tnLst>
+      <p:par>
+        <p:cTn id="1" dur="indefinite" restart="never" nodeType="tmRoot"/>
+      </p:par>
+    </p:tnLst>
+  </p:timing>
+</p:sld>
+</file>
+
+<file path=ppt/slides/slide3.xml><?xml version="1.0" encoding="utf-8"?>
+<p:sld xmlns:a="http://schemas.openxmlformats.org/drawingml/2006/main" xmlns:r="http://schemas.openxmlformats.org/officeDocument/2006/relationships" xmlns:p="http://schemas.openxmlformats.org/presentationml/2006/main">
+  <p:cSld>
+    <p:spTree>
+      <p:nvGrpSpPr>
+        <p:cNvPr id="1" name=""/>
+        <p:cNvGrpSpPr/>
+        <p:nvPr/>
+      </p:nvGrpSpPr>
+      <p:grpSpPr>
+        <a:xfrm>
+          <a:off x="0" y="0"/>
+          <a:ext cx="0" cy="0"/>
+          <a:chOff x="0" y="0"/>
+          <a:chExt cx="0" cy="0"/>
+        </a:xfrm>
+      </p:grpSpPr>
+      <p:sp>
+        <p:nvSpPr>
+          <p:cNvPr id="2" name="Titel 1"/>
+          <p:cNvSpPr>
+            <a:spLocks noGrp="1"/>
+          </p:cNvSpPr>
+          <p:nvPr>
+            <p:ph type="title"/>
+          </p:nvPr>
+        </p:nvSpPr>
+        <p:spPr/>
+        <p:txBody>
+          <a:bodyPr/>
+          <a:lstStyle/>
+          <a:p>
+            <a:r>
+              <a:rPr lang="de-DE" dirty="0" err="1" smtClean="0"/>
+              <a:t>Introduction</a:t>
+            </a:r>
+            <a:r>
+              <a:rPr lang="de-DE" dirty="0" smtClean="0"/>
+              <a:t>: </a:t>
+            </a:r>
+            <a:r>
+              <a:rPr lang="de-DE" dirty="0" err="1" smtClean="0"/>
+              <a:t>Biology</a:t>
+            </a:r>
+            <a:endParaRPr lang="de-DE" dirty="0"/>
+          </a:p>
+        </p:txBody>
+      </p:sp>
+      <p:sp>
+        <p:nvSpPr>
+          <p:cNvPr id="3" name="Inhaltsplatzhalter 2"/>
+          <p:cNvSpPr>
+            <a:spLocks noGrp="1"/>
+          </p:cNvSpPr>
+          <p:nvPr>
+            <p:ph idx="1"/>
+          </p:nvPr>
+        </p:nvSpPr>
+        <p:spPr/>
+        <p:txBody>
+          <a:bodyPr/>
+          <a:lstStyle/>
+          <a:p>
+            <a:endParaRPr lang="de-DE"/>
+          </a:p>
+        </p:txBody>
+      </p:sp>
+      <p:sp>
+        <p:nvSpPr>
+          <p:cNvPr id="4" name="Datumsplatzhalter 3"/>
+          <p:cNvSpPr>
+            <a:spLocks noGrp="1"/>
+          </p:cNvSpPr>
+          <p:nvPr>
+            <p:ph type="dt" sz="half" idx="10"/>
+          </p:nvPr>
+        </p:nvSpPr>
+        <p:spPr/>
+        <p:txBody>
+          <a:bodyPr/>
+          <a:lstStyle/>
+          <a:p>
+            <a:fld id="{3A9EBC61-E80D-42A0-BF7D-1DD7BEDB77ED}" type="datetime1">
+              <a:rPr lang="de-DE" smtClean="0"/>
+              <a:t>19.11.2015</a:t>
+            </a:fld>
+            <a:endParaRPr lang="de-DE"/>
+          </a:p>
+        </p:txBody>
+      </p:sp>
+      <p:sp>
+        <p:nvSpPr>
+          <p:cNvPr id="5" name="Fußzeilenplatzhalter 4"/>
+          <p:cNvSpPr>
+            <a:spLocks noGrp="1"/>
+          </p:cNvSpPr>
+          <p:nvPr>
+            <p:ph type="ftr" sz="quarter" idx="11"/>
+          </p:nvPr>
+        </p:nvSpPr>
+        <p:spPr/>
+        <p:txBody>
+          <a:bodyPr/>
+          <a:lstStyle/>
+          <a:p>
+            <a:r>
+              <a:rPr lang="de-DE" smtClean="0"/>
+              <a:t>Poodle Project - Jonas Ditz and Benjamin Schroeder</a:t>
+            </a:r>
+            <a:endParaRPr lang="de-DE"/>
+          </a:p>
+        </p:txBody>
+      </p:sp>
+      <p:sp>
+        <p:nvSpPr>
+          <p:cNvPr id="6" name="Foliennummernplatzhalter 5"/>
+          <p:cNvSpPr>
+            <a:spLocks noGrp="1"/>
+          </p:cNvSpPr>
+          <p:nvPr>
+            <p:ph type="sldNum" sz="quarter" idx="12"/>
+          </p:nvPr>
+        </p:nvSpPr>
+        <p:spPr/>
+        <p:txBody>
+          <a:bodyPr/>
+          <a:lstStyle/>
+          <a:p>
+            <a:fld id="{E8AB856E-2E56-4FC0-8A9B-687E2E16A621}" type="slidenum">
+              <a:rPr lang="de-DE" smtClean="0"/>
+              <a:t>3</a:t>
+            </a:fld>
+            <a:endParaRPr lang="de-DE"/>
+          </a:p>
+        </p:txBody>
+      </p:sp>
+    </p:spTree>
+    <p:extLst>
+      <p:ext uri="{BB962C8B-B14F-4D97-AF65-F5344CB8AC3E}">
+        <p14:creationId xmlns:p14="http://schemas.microsoft.com/office/powerpoint/2010/main" val="563008967"/>
+      </p:ext>
+    </p:extLst>
+  </p:cSld>
+  <p:clrMapOvr>
+    <a:masterClrMapping/>
+  </p:clrMapOvr>
+  <p:timing>
+    <p:tnLst>
+      <p:par>
+        <p:cTn id="1" dur="indefinite" restart="never" nodeType="tmRoot"/>
+      </p:par>
+    </p:tnLst>
+  </p:timing>
+</p:sld>
+</file>
+
+<file path=ppt/slides/slide4.xml><?xml version="1.0" encoding="utf-8"?>
+<p:sld xmlns:a="http://schemas.openxmlformats.org/drawingml/2006/main" xmlns:r="http://schemas.openxmlformats.org/officeDocument/2006/relationships" xmlns:p="http://schemas.openxmlformats.org/presentationml/2006/main">
+  <p:cSld>
+    <p:spTree>
+      <p:nvGrpSpPr>
+        <p:cNvPr id="1" name=""/>
+        <p:cNvGrpSpPr/>
+        <p:nvPr/>
+      </p:nvGrpSpPr>
+      <p:grpSpPr>
+        <a:xfrm>
+          <a:off x="0" y="0"/>
+          <a:ext cx="0" cy="0"/>
+          <a:chOff x="0" y="0"/>
+          <a:chExt cx="0" cy="0"/>
+        </a:xfrm>
+      </p:grpSpPr>
+      <p:sp>
+        <p:nvSpPr>
+          <p:cNvPr id="2" name="Titel 1"/>
+          <p:cNvSpPr>
+            <a:spLocks noGrp="1"/>
+          </p:cNvSpPr>
+          <p:nvPr>
+            <p:ph type="title"/>
+          </p:nvPr>
+        </p:nvSpPr>
+        <p:spPr/>
+        <p:txBody>
+          <a:bodyPr/>
+          <a:lstStyle/>
+          <a:p>
+            <a:r>
+              <a:rPr lang="de-DE" dirty="0" err="1" smtClean="0"/>
+              <a:t>Introduction</a:t>
+            </a:r>
+            <a:r>
+              <a:rPr lang="de-DE" dirty="0" smtClean="0"/>
+              <a:t>: </a:t>
+            </a:r>
+            <a:r>
+              <a:rPr lang="de-DE" dirty="0" err="1" smtClean="0"/>
+              <a:t>Biology</a:t>
+            </a:r>
+            <a:endParaRPr lang="de-DE" dirty="0"/>
+          </a:p>
+        </p:txBody>
+      </p:sp>
+      <p:sp>
+        <p:nvSpPr>
+          <p:cNvPr id="3" name="Inhaltsplatzhalter 2"/>
+          <p:cNvSpPr>
+            <a:spLocks noGrp="1"/>
+          </p:cNvSpPr>
+          <p:nvPr>
+            <p:ph idx="1"/>
+          </p:nvPr>
+        </p:nvSpPr>
+        <p:spPr/>
+        <p:txBody>
+          <a:bodyPr/>
+          <a:lstStyle/>
+          <a:p>
+            <a:endParaRPr lang="de-DE"/>
+          </a:p>
+        </p:txBody>
+      </p:sp>
+      <p:sp>
+        <p:nvSpPr>
+          <p:cNvPr id="4" name="Datumsplatzhalter 3"/>
+          <p:cNvSpPr>
+            <a:spLocks noGrp="1"/>
+          </p:cNvSpPr>
+          <p:nvPr>
+            <p:ph type="dt" sz="half" idx="10"/>
+          </p:nvPr>
+        </p:nvSpPr>
+        <p:spPr/>
+        <p:txBody>
+          <a:bodyPr/>
+          <a:lstStyle/>
+          <a:p>
+            <a:fld id="{3A9EBC61-E80D-42A0-BF7D-1DD7BEDB77ED}" type="datetime1">
+              <a:rPr lang="de-DE" smtClean="0"/>
+              <a:t>19.11.2015</a:t>
+            </a:fld>
+            <a:endParaRPr lang="de-DE"/>
+          </a:p>
+        </p:txBody>
+      </p:sp>
+      <p:sp>
+        <p:nvSpPr>
+          <p:cNvPr id="5" name="Fußzeilenplatzhalter 4"/>
+          <p:cNvSpPr>
+            <a:spLocks noGrp="1"/>
+          </p:cNvSpPr>
+          <p:nvPr>
+            <p:ph type="ftr" sz="quarter" idx="11"/>
+          </p:nvPr>
+        </p:nvSpPr>
+        <p:spPr/>
+        <p:txBody>
+          <a:bodyPr/>
+          <a:lstStyle/>
+          <a:p>
+            <a:r>
+              <a:rPr lang="de-DE" smtClean="0"/>
+              <a:t>Poodle Project - Jonas Ditz and Benjamin Schroeder</a:t>
+            </a:r>
+            <a:endParaRPr lang="de-DE"/>
+          </a:p>
+        </p:txBody>
+      </p:sp>
+      <p:sp>
+        <p:nvSpPr>
+          <p:cNvPr id="6" name="Foliennummernplatzhalter 5"/>
+          <p:cNvSpPr>
+            <a:spLocks noGrp="1"/>
+          </p:cNvSpPr>
+          <p:nvPr>
+            <p:ph type="sldNum" sz="quarter" idx="12"/>
+          </p:nvPr>
+        </p:nvSpPr>
+        <p:spPr/>
+        <p:txBody>
+          <a:bodyPr/>
+          <a:lstStyle/>
+          <a:p>
+            <a:fld id="{E8AB856E-2E56-4FC0-8A9B-687E2E16A621}" type="slidenum">
+              <a:rPr lang="de-DE" smtClean="0"/>
+              <a:t>4</a:t>
+            </a:fld>
+            <a:endParaRPr lang="de-DE"/>
+          </a:p>
+        </p:txBody>
+      </p:sp>
+    </p:spTree>
+    <p:extLst>
+      <p:ext uri="{BB962C8B-B14F-4D97-AF65-F5344CB8AC3E}">
+        <p14:creationId xmlns:p14="http://schemas.microsoft.com/office/powerpoint/2010/main" val="2856590114"/>
+      </p:ext>
+    </p:extLst>
+  </p:cSld>
+  <p:clrMapOvr>
+    <a:masterClrMapping/>
+  </p:clrMapOvr>
+  <p:timing>
+    <p:tnLst>
+      <p:par>
+        <p:cTn id="1" dur="indefinite" restart="never" nodeType="tmRoot"/>
+      </p:par>
+    </p:tnLst>
+  </p:timing>
+</p:sld>
+</file>
+
+<file path=ppt/slides/slide5.xml><?xml version="1.0" encoding="utf-8"?>
+<p:sld xmlns:a="http://schemas.openxmlformats.org/drawingml/2006/main" xmlns:r="http://schemas.openxmlformats.org/officeDocument/2006/relationships" xmlns:p="http://schemas.openxmlformats.org/presentationml/2006/main">
+  <p:cSld>
+    <p:spTree>
+      <p:nvGrpSpPr>
+        <p:cNvPr id="1" name=""/>
+        <p:cNvGrpSpPr/>
+        <p:nvPr/>
+      </p:nvGrpSpPr>
+      <p:grpSpPr>
+        <a:xfrm>
+          <a:off x="0" y="0"/>
+          <a:ext cx="0" cy="0"/>
+          <a:chOff x="0" y="0"/>
+          <a:chExt cx="0" cy="0"/>
+        </a:xfrm>
+      </p:grpSpPr>
+      <p:sp>
+        <p:nvSpPr>
+          <p:cNvPr id="2" name="Titel 1"/>
+          <p:cNvSpPr>
+            <a:spLocks noGrp="1"/>
+          </p:cNvSpPr>
+          <p:nvPr>
+            <p:ph type="title"/>
+          </p:nvPr>
+        </p:nvSpPr>
+        <p:spPr/>
+        <p:txBody>
+          <a:bodyPr/>
+          <a:lstStyle/>
+          <a:p>
+            <a:r>
+              <a:rPr lang="de-DE" dirty="0" err="1" smtClean="0"/>
+              <a:t>Introduction</a:t>
+            </a:r>
+            <a:r>
+              <a:rPr lang="de-DE" dirty="0" smtClean="0"/>
+              <a:t>: </a:t>
+            </a:r>
+            <a:r>
+              <a:rPr lang="de-DE" dirty="0" err="1" smtClean="0"/>
+              <a:t>Biology</a:t>
+            </a:r>
+            <a:endParaRPr lang="de-DE" dirty="0"/>
+          </a:p>
+        </p:txBody>
+      </p:sp>
+      <p:sp>
+        <p:nvSpPr>
+          <p:cNvPr id="3" name="Inhaltsplatzhalter 2"/>
+          <p:cNvSpPr>
+            <a:spLocks noGrp="1"/>
+          </p:cNvSpPr>
+          <p:nvPr>
+            <p:ph idx="1"/>
+          </p:nvPr>
+        </p:nvSpPr>
+        <p:spPr/>
+        <p:txBody>
+          <a:bodyPr/>
+          <a:lstStyle/>
+          <a:p>
+            <a:endParaRPr lang="de-DE"/>
+          </a:p>
+        </p:txBody>
+      </p:sp>
+      <p:sp>
+        <p:nvSpPr>
+          <p:cNvPr id="4" name="Datumsplatzhalter 3"/>
+          <p:cNvSpPr>
+            <a:spLocks noGrp="1"/>
+          </p:cNvSpPr>
+          <p:nvPr>
+            <p:ph type="dt" sz="half" idx="10"/>
+          </p:nvPr>
+        </p:nvSpPr>
+        <p:spPr/>
+        <p:txBody>
+          <a:bodyPr/>
+          <a:lstStyle/>
+          <a:p>
+            <a:fld id="{3A9EBC61-E80D-42A0-BF7D-1DD7BEDB77ED}" type="datetime1">
+              <a:rPr lang="de-DE" smtClean="0"/>
+              <a:t>19.11.2015</a:t>
+            </a:fld>
+            <a:endParaRPr lang="de-DE"/>
+          </a:p>
+        </p:txBody>
+      </p:sp>
+      <p:sp>
+        <p:nvSpPr>
+          <p:cNvPr id="5" name="Fußzeilenplatzhalter 4"/>
+          <p:cNvSpPr>
+            <a:spLocks noGrp="1"/>
+          </p:cNvSpPr>
+          <p:nvPr>
+            <p:ph type="ftr" sz="quarter" idx="11"/>
+          </p:nvPr>
+        </p:nvSpPr>
+        <p:spPr/>
+        <p:txBody>
+          <a:bodyPr/>
+          <a:lstStyle/>
+          <a:p>
+            <a:r>
+              <a:rPr lang="de-DE" smtClean="0"/>
+              <a:t>Poodle Project - Jonas Ditz and Benjamin Schroeder</a:t>
+            </a:r>
+            <a:endParaRPr lang="de-DE"/>
+          </a:p>
+        </p:txBody>
+      </p:sp>
+      <p:sp>
+        <p:nvSpPr>
+          <p:cNvPr id="6" name="Foliennummernplatzhalter 5"/>
+          <p:cNvSpPr>
+            <a:spLocks noGrp="1"/>
+          </p:cNvSpPr>
+          <p:nvPr>
+            <p:ph type="sldNum" sz="quarter" idx="12"/>
+          </p:nvPr>
+        </p:nvSpPr>
+        <p:spPr/>
+        <p:txBody>
+          <a:bodyPr/>
+          <a:lstStyle/>
+          <a:p>
+            <a:fld id="{E8AB856E-2E56-4FC0-8A9B-687E2E16A621}" type="slidenum">
+              <a:rPr lang="de-DE" smtClean="0"/>
+              <a:t>5</a:t>
+            </a:fld>
+            <a:endParaRPr lang="de-DE"/>
+          </a:p>
+        </p:txBody>
+      </p:sp>
+    </p:spTree>
+    <p:extLst>
+      <p:ext uri="{BB962C8B-B14F-4D97-AF65-F5344CB8AC3E}">
+        <p14:creationId xmlns:p14="http://schemas.microsoft.com/office/powerpoint/2010/main" val="2838341455"/>
       </p:ext>
     </p:extLst>
   </p:cSld>

</xml_diff>